<commit_message>
thank you page implemented
</commit_message>
<xml_diff>
--- a/Presentation2.pptx
+++ b/Presentation2.pptx
@@ -6,6 +6,9 @@
   </p:sldMasterIdLst>
   <p:sldIdLst>
     <p:sldId id="256" r:id="rId2"/>
+    <p:sldId id="257" r:id="rId3"/>
+    <p:sldId id="258" r:id="rId4"/>
+    <p:sldId id="259" r:id="rId5"/>
   </p:sldIdLst>
   <p:sldSz cx="12192000" cy="6858000"/>
   <p:notesSz cx="6858000" cy="9144000"/>
@@ -104,6 +107,11 @@
       </a:defRPr>
     </a:lvl9pPr>
   </p:defaultTextStyle>
+  <p:extLst>
+    <p:ext uri="{EFAFB233-063F-42B5-8137-9DF3F51BA10A}">
+      <p15:sldGuideLst xmlns:p15="http://schemas.microsoft.com/office/powerpoint/2012/main"/>
+    </p:ext>
+  </p:extLst>
 </p:presentation>
 </file>
 
@@ -238,7 +246,7 @@
           <a:p>
             <a:fld id="{17EF1BA5-1712-4352-A9B6-FFB7F3464678}" type="datetimeFigureOut">
               <a:rPr lang="en-IN" smtClean="0"/>
-              <a:t>08-10-2023</a:t>
+              <a:t>13-10-2023</a:t>
             </a:fld>
             <a:endParaRPr lang="en-IN"/>
           </a:p>
@@ -408,7 +416,7 @@
           <a:p>
             <a:fld id="{17EF1BA5-1712-4352-A9B6-FFB7F3464678}" type="datetimeFigureOut">
               <a:rPr lang="en-IN" smtClean="0"/>
-              <a:t>08-10-2023</a:t>
+              <a:t>13-10-2023</a:t>
             </a:fld>
             <a:endParaRPr lang="en-IN"/>
           </a:p>
@@ -588,7 +596,7 @@
           <a:p>
             <a:fld id="{17EF1BA5-1712-4352-A9B6-FFB7F3464678}" type="datetimeFigureOut">
               <a:rPr lang="en-IN" smtClean="0"/>
-              <a:t>08-10-2023</a:t>
+              <a:t>13-10-2023</a:t>
             </a:fld>
             <a:endParaRPr lang="en-IN"/>
           </a:p>
@@ -758,7 +766,7 @@
           <a:p>
             <a:fld id="{17EF1BA5-1712-4352-A9B6-FFB7F3464678}" type="datetimeFigureOut">
               <a:rPr lang="en-IN" smtClean="0"/>
-              <a:t>08-10-2023</a:t>
+              <a:t>13-10-2023</a:t>
             </a:fld>
             <a:endParaRPr lang="en-IN"/>
           </a:p>
@@ -1004,7 +1012,7 @@
           <a:p>
             <a:fld id="{17EF1BA5-1712-4352-A9B6-FFB7F3464678}" type="datetimeFigureOut">
               <a:rPr lang="en-IN" smtClean="0"/>
-              <a:t>08-10-2023</a:t>
+              <a:t>13-10-2023</a:t>
             </a:fld>
             <a:endParaRPr lang="en-IN"/>
           </a:p>
@@ -1236,7 +1244,7 @@
           <a:p>
             <a:fld id="{17EF1BA5-1712-4352-A9B6-FFB7F3464678}" type="datetimeFigureOut">
               <a:rPr lang="en-IN" smtClean="0"/>
-              <a:t>08-10-2023</a:t>
+              <a:t>13-10-2023</a:t>
             </a:fld>
             <a:endParaRPr lang="en-IN"/>
           </a:p>
@@ -1603,7 +1611,7 @@
           <a:p>
             <a:fld id="{17EF1BA5-1712-4352-A9B6-FFB7F3464678}" type="datetimeFigureOut">
               <a:rPr lang="en-IN" smtClean="0"/>
-              <a:t>08-10-2023</a:t>
+              <a:t>13-10-2023</a:t>
             </a:fld>
             <a:endParaRPr lang="en-IN"/>
           </a:p>
@@ -1721,7 +1729,7 @@
           <a:p>
             <a:fld id="{17EF1BA5-1712-4352-A9B6-FFB7F3464678}" type="datetimeFigureOut">
               <a:rPr lang="en-IN" smtClean="0"/>
-              <a:t>08-10-2023</a:t>
+              <a:t>13-10-2023</a:t>
             </a:fld>
             <a:endParaRPr lang="en-IN"/>
           </a:p>
@@ -1816,7 +1824,7 @@
           <a:p>
             <a:fld id="{17EF1BA5-1712-4352-A9B6-FFB7F3464678}" type="datetimeFigureOut">
               <a:rPr lang="en-IN" smtClean="0"/>
-              <a:t>08-10-2023</a:t>
+              <a:t>13-10-2023</a:t>
             </a:fld>
             <a:endParaRPr lang="en-IN"/>
           </a:p>
@@ -2093,7 +2101,7 @@
           <a:p>
             <a:fld id="{17EF1BA5-1712-4352-A9B6-FFB7F3464678}" type="datetimeFigureOut">
               <a:rPr lang="en-IN" smtClean="0"/>
-              <a:t>08-10-2023</a:t>
+              <a:t>13-10-2023</a:t>
             </a:fld>
             <a:endParaRPr lang="en-IN"/>
           </a:p>
@@ -2346,7 +2354,7 @@
           <a:p>
             <a:fld id="{17EF1BA5-1712-4352-A9B6-FFB7F3464678}" type="datetimeFigureOut">
               <a:rPr lang="en-IN" smtClean="0"/>
-              <a:t>08-10-2023</a:t>
+              <a:t>13-10-2023</a:t>
             </a:fld>
             <a:endParaRPr lang="en-IN"/>
           </a:p>
@@ -2559,7 +2567,7 @@
           <a:p>
             <a:fld id="{17EF1BA5-1712-4352-A9B6-FFB7F3464678}" type="datetimeFigureOut">
               <a:rPr lang="en-IN" smtClean="0"/>
-              <a:t>08-10-2023</a:t>
+              <a:t>13-10-2023</a:t>
             </a:fld>
             <a:endParaRPr lang="en-IN"/>
           </a:p>
@@ -3114,6 +3122,329 @@
 </p:sld>
 </file>
 
+<file path=ppt/slides/slide2.xml><?xml version="1.0" encoding="utf-8"?>
+<p:sld xmlns:a="http://schemas.openxmlformats.org/drawingml/2006/main" xmlns:r="http://schemas.openxmlformats.org/officeDocument/2006/relationships" xmlns:p="http://schemas.openxmlformats.org/presentationml/2006/main">
+  <p:cSld>
+    <p:spTree>
+      <p:nvGrpSpPr>
+        <p:cNvPr id="1" name=""/>
+        <p:cNvGrpSpPr/>
+        <p:nvPr/>
+      </p:nvGrpSpPr>
+      <p:grpSpPr>
+        <a:xfrm>
+          <a:off x="0" y="0"/>
+          <a:ext cx="0" cy="0"/>
+          <a:chOff x="0" y="0"/>
+          <a:chExt cx="0" cy="0"/>
+        </a:xfrm>
+      </p:grpSpPr>
+      <p:pic>
+        <p:nvPicPr>
+          <p:cNvPr id="1026" name="Picture 2" descr="Logout, Sign Out Icon Vector in Circle Button 6388924 Vector Art at Vecteezy"/>
+          <p:cNvPicPr>
+            <a:picLocks noChangeAspect="1" noChangeArrowheads="1"/>
+          </p:cNvPicPr>
+          <p:nvPr/>
+        </p:nvPicPr>
+        <p:blipFill rotWithShape="1">
+          <a:blip r:embed="rId2" cstate="print">
+            <a:duotone>
+              <a:schemeClr val="accent2">
+                <a:shade val="45000"/>
+                <a:satMod val="135000"/>
+              </a:schemeClr>
+              <a:prstClr val="white"/>
+            </a:duotone>
+            <a:extLst>
+              <a:ext uri="{BEBA8EAE-BF5A-486C-A8C5-ECC9F3942E4B}">
+                <a14:imgProps xmlns:a14="http://schemas.microsoft.com/office/drawing/2010/main">
+                  <a14:imgLayer r:embed="rId3">
+                    <a14:imgEffect>
+                      <a14:backgroundRemoval t="26667" b="73958" l="25365" r="72656">
+                        <a14:foregroundMark x1="60625" y1="51146" x2="60625" y2="51146"/>
+                        <a14:foregroundMark x1="59219" y1="47760" x2="59219" y2="47760"/>
+                        <a14:foregroundMark x1="50052" y1="41042" x2="50052" y2="41042"/>
+                        <a14:foregroundMark x1="43594" y1="41042" x2="52969" y2="57865"/>
+                        <a14:foregroundMark x1="43333" y1="58802" x2="43125" y2="45365"/>
+                        <a14:foregroundMark x1="43594" y1="44896" x2="43333" y2="40833"/>
+                        <a14:foregroundMark x1="43333" y1="40833" x2="53698" y2="40833"/>
+                        <a14:foregroundMark x1="53698" y1="41771" x2="53698" y2="44167"/>
+                        <a14:foregroundMark x1="48385" y1="49688" x2="60417" y2="49948"/>
+                        <a14:foregroundMark x1="60885" y1="49479" x2="60885" y2="49479"/>
+                        <a14:foregroundMark x1="60885" y1="49479" x2="57031" y2="53802"/>
+                        <a14:foregroundMark x1="53906" y1="55677" x2="53906" y2="58594"/>
+                        <a14:foregroundMark x1="53698" y1="59062" x2="48646" y2="59062"/>
+                      </a14:backgroundRemoval>
+                    </a14:imgEffect>
+                  </a14:imgLayer>
+                </a14:imgProps>
+              </a:ext>
+              <a:ext uri="{28A0092B-C50C-407E-A947-70E740481C1C}">
+                <a14:useLocalDpi xmlns:a14="http://schemas.microsoft.com/office/drawing/2010/main" val="0"/>
+              </a:ext>
+            </a:extLst>
+          </a:blip>
+          <a:srcRect l="25597" t="26417" r="26881" b="26061"/>
+          <a:stretch/>
+        </p:blipFill>
+        <p:spPr bwMode="auto">
+          <a:xfrm>
+            <a:off x="724280" y="672867"/>
+            <a:ext cx="316870" cy="316870"/>
+          </a:xfrm>
+          <a:prstGeom prst="rect">
+            <a:avLst/>
+          </a:prstGeom>
+          <a:noFill/>
+          <a:extLst>
+            <a:ext uri="{909E8E84-426E-40DD-AFC4-6F175D3DCCD1}">
+              <a14:hiddenFill xmlns:a14="http://schemas.microsoft.com/office/drawing/2010/main">
+                <a:solidFill>
+                  <a:srgbClr val="FFFFFF"/>
+                </a:solidFill>
+              </a14:hiddenFill>
+            </a:ext>
+          </a:extLst>
+        </p:spPr>
+      </p:pic>
+      <p:pic>
+        <p:nvPicPr>
+          <p:cNvPr id="1028" name="Picture 4" descr="Back button Generic Glyph icon"/>
+          <p:cNvPicPr>
+            <a:picLocks noChangeAspect="1" noChangeArrowheads="1"/>
+          </p:cNvPicPr>
+          <p:nvPr/>
+        </p:nvPicPr>
+        <p:blipFill>
+          <a:blip r:embed="rId4" cstate="print">
+            <a:duotone>
+              <a:schemeClr val="accent2">
+                <a:shade val="45000"/>
+                <a:satMod val="135000"/>
+              </a:schemeClr>
+              <a:prstClr val="white"/>
+            </a:duotone>
+            <a:extLst>
+              <a:ext uri="{28A0092B-C50C-407E-A947-70E740481C1C}">
+                <a14:useLocalDpi xmlns:a14="http://schemas.microsoft.com/office/drawing/2010/main" val="0"/>
+              </a:ext>
+            </a:extLst>
+          </a:blip>
+          <a:srcRect/>
+          <a:stretch>
+            <a:fillRect/>
+          </a:stretch>
+        </p:blipFill>
+        <p:spPr bwMode="auto">
+          <a:xfrm>
+            <a:off x="1169564" y="645058"/>
+            <a:ext cx="372488" cy="372488"/>
+          </a:xfrm>
+          <a:prstGeom prst="rect">
+            <a:avLst/>
+          </a:prstGeom>
+          <a:noFill/>
+          <a:extLst>
+            <a:ext uri="{909E8E84-426E-40DD-AFC4-6F175D3DCCD1}">
+              <a14:hiddenFill xmlns:a14="http://schemas.microsoft.com/office/drawing/2010/main">
+                <a:solidFill>
+                  <a:srgbClr val="FFFFFF"/>
+                </a:solidFill>
+              </a14:hiddenFill>
+            </a:ext>
+          </a:extLst>
+        </p:spPr>
+      </p:pic>
+      <p:pic>
+        <p:nvPicPr>
+          <p:cNvPr id="1030" name="Picture 6" descr="Go Back Arrow Button Svg Png Icon Free Download (#68528) -  OnlineWebFonts.COM"/>
+          <p:cNvPicPr>
+            <a:picLocks noChangeAspect="1" noChangeArrowheads="1"/>
+          </p:cNvPicPr>
+          <p:nvPr/>
+        </p:nvPicPr>
+        <p:blipFill>
+          <a:blip r:embed="rId5" cstate="print">
+            <a:duotone>
+              <a:schemeClr val="accent6">
+                <a:shade val="45000"/>
+                <a:satMod val="135000"/>
+              </a:schemeClr>
+              <a:prstClr val="white"/>
+            </a:duotone>
+            <a:extLst>
+              <a:ext uri="{28A0092B-C50C-407E-A947-70E740481C1C}">
+                <a14:useLocalDpi xmlns:a14="http://schemas.microsoft.com/office/drawing/2010/main" val="0"/>
+              </a:ext>
+            </a:extLst>
+          </a:blip>
+          <a:srcRect/>
+          <a:stretch>
+            <a:fillRect/>
+          </a:stretch>
+        </p:blipFill>
+        <p:spPr bwMode="auto">
+          <a:xfrm>
+            <a:off x="1670466" y="645058"/>
+            <a:ext cx="269342" cy="269342"/>
+          </a:xfrm>
+          <a:prstGeom prst="rect">
+            <a:avLst/>
+          </a:prstGeom>
+          <a:noFill/>
+          <a:extLst>
+            <a:ext uri="{909E8E84-426E-40DD-AFC4-6F175D3DCCD1}">
+              <a14:hiddenFill xmlns:a14="http://schemas.microsoft.com/office/drawing/2010/main">
+                <a:solidFill>
+                  <a:srgbClr val="FFFFFF"/>
+                </a:solidFill>
+              </a14:hiddenFill>
+            </a:ext>
+          </a:extLst>
+        </p:spPr>
+      </p:pic>
+    </p:spTree>
+    <p:extLst>
+      <p:ext uri="{BB962C8B-B14F-4D97-AF65-F5344CB8AC3E}">
+        <p14:creationId xmlns:p14="http://schemas.microsoft.com/office/powerpoint/2010/main" val="258985730"/>
+      </p:ext>
+    </p:extLst>
+  </p:cSld>
+  <p:clrMapOvr>
+    <a:masterClrMapping/>
+  </p:clrMapOvr>
+</p:sld>
+</file>
+
+<file path=ppt/slides/slide3.xml><?xml version="1.0" encoding="utf-8"?>
+<p:sld xmlns:a="http://schemas.openxmlformats.org/drawingml/2006/main" xmlns:r="http://schemas.openxmlformats.org/officeDocument/2006/relationships" xmlns:p="http://schemas.openxmlformats.org/presentationml/2006/main">
+  <p:cSld>
+    <p:bg>
+      <p:bgPr>
+        <a:solidFill>
+          <a:srgbClr val="FFE5D8"/>
+        </a:solidFill>
+        <a:effectLst/>
+      </p:bgPr>
+    </p:bg>
+    <p:spTree>
+      <p:nvGrpSpPr>
+        <p:cNvPr id="1" name=""/>
+        <p:cNvGrpSpPr/>
+        <p:nvPr/>
+      </p:nvGrpSpPr>
+      <p:grpSpPr>
+        <a:xfrm>
+          <a:off x="0" y="0"/>
+          <a:ext cx="0" cy="0"/>
+          <a:chOff x="0" y="0"/>
+          <a:chExt cx="0" cy="0"/>
+        </a:xfrm>
+      </p:grpSpPr>
+      <p:pic>
+        <p:nvPicPr>
+          <p:cNvPr id="9" name="Picture 8"/>
+          <p:cNvPicPr>
+            <a:picLocks noChangeAspect="1"/>
+          </p:cNvPicPr>
+          <p:nvPr/>
+        </p:nvPicPr>
+        <p:blipFill>
+          <a:blip r:embed="rId2">
+            <a:extLst>
+              <a:ext uri="{28A0092B-C50C-407E-A947-70E740481C1C}">
+                <a14:useLocalDpi xmlns:a14="http://schemas.microsoft.com/office/drawing/2010/main" val="0"/>
+              </a:ext>
+            </a:extLst>
+          </a:blip>
+          <a:stretch>
+            <a:fillRect/>
+          </a:stretch>
+        </p:blipFill>
+        <p:spPr>
+          <a:xfrm>
+            <a:off x="0" y="0"/>
+            <a:ext cx="9144000" cy="5143500"/>
+          </a:xfrm>
+          <a:prstGeom prst="rect">
+            <a:avLst/>
+          </a:prstGeom>
+        </p:spPr>
+      </p:pic>
+    </p:spTree>
+    <p:extLst>
+      <p:ext uri="{BB962C8B-B14F-4D97-AF65-F5344CB8AC3E}">
+        <p14:creationId xmlns:p14="http://schemas.microsoft.com/office/powerpoint/2010/main" val="2390581466"/>
+      </p:ext>
+    </p:extLst>
+  </p:cSld>
+  <p:clrMapOvr>
+    <a:masterClrMapping/>
+  </p:clrMapOvr>
+</p:sld>
+</file>
+
+<file path=ppt/slides/slide4.xml><?xml version="1.0" encoding="utf-8"?>
+<p:sld xmlns:a="http://schemas.openxmlformats.org/drawingml/2006/main" xmlns:r="http://schemas.openxmlformats.org/officeDocument/2006/relationships" xmlns:p="http://schemas.openxmlformats.org/presentationml/2006/main">
+  <p:cSld>
+    <p:spTree>
+      <p:nvGrpSpPr>
+        <p:cNvPr id="1" name=""/>
+        <p:cNvGrpSpPr/>
+        <p:nvPr/>
+      </p:nvGrpSpPr>
+      <p:grpSpPr>
+        <a:xfrm>
+          <a:off x="0" y="0"/>
+          <a:ext cx="0" cy="0"/>
+          <a:chOff x="0" y="0"/>
+          <a:chExt cx="0" cy="0"/>
+        </a:xfrm>
+      </p:grpSpPr>
+      <p:pic>
+        <p:nvPicPr>
+          <p:cNvPr id="4" name="Picture 3"/>
+          <p:cNvPicPr>
+            <a:picLocks noChangeAspect="1"/>
+          </p:cNvPicPr>
+          <p:nvPr/>
+        </p:nvPicPr>
+        <p:blipFill>
+          <a:blip r:embed="rId2">
+            <a:extLst>
+              <a:ext uri="{28A0092B-C50C-407E-A947-70E740481C1C}">
+                <a14:useLocalDpi xmlns:a14="http://schemas.microsoft.com/office/drawing/2010/main" val="0"/>
+              </a:ext>
+            </a:extLst>
+          </a:blip>
+          <a:stretch>
+            <a:fillRect/>
+          </a:stretch>
+        </p:blipFill>
+        <p:spPr>
+          <a:xfrm>
+            <a:off x="0" y="-1"/>
+            <a:ext cx="6781076" cy="3814355"/>
+          </a:xfrm>
+          <a:prstGeom prst="rect">
+            <a:avLst/>
+          </a:prstGeom>
+        </p:spPr>
+      </p:pic>
+    </p:spTree>
+    <p:extLst>
+      <p:ext uri="{BB962C8B-B14F-4D97-AF65-F5344CB8AC3E}">
+        <p14:creationId xmlns:p14="http://schemas.microsoft.com/office/powerpoint/2010/main" val="3232917652"/>
+      </p:ext>
+    </p:extLst>
+  </p:cSld>
+  <p:clrMapOvr>
+    <a:masterClrMapping/>
+  </p:clrMapOvr>
+</p:sld>
+</file>
+
 <file path=ppt/theme/theme1.xml><?xml version="1.0" encoding="utf-8"?>
 <a:theme xmlns:a="http://schemas.openxmlformats.org/drawingml/2006/main" name="Office Theme">
   <a:themeElements>

</xml_diff>